<commit_message>
Update README.md to fix the year in the paper presentation link
</commit_message>
<xml_diff>
--- a/Papers/2024/Pharmasug 2024/DS-109.pptx
+++ b/Papers/2024/Pharmasug 2024/DS-109.pptx
@@ -10340,7 +10340,7 @@
               <a:rPr lang="en-US" smtClean="0">
                 <a:latin typeface="Arial" panose="020B0604020202020204" pitchFamily="34" charset="0"/>
               </a:rPr>
-              <a:t>5/18/24</a:t>
+              <a:t>5/20/24</a:t>
             </a:fld>
             <a:endParaRPr lang="en-US" dirty="0">
               <a:latin typeface="Arial" panose="020B0604020202020204" pitchFamily="34" charset="0"/>
@@ -10530,7 +10530,7 @@
             <a:fld id="{5E86C78A-CFB9-4257-917F-C10E0100DA19}" type="datetimeFigureOut">
               <a:rPr lang="en-US" smtClean="0"/>
               <a:pPr/>
-              <a:t>5/18/24</a:t>
+              <a:t>5/20/24</a:t>
             </a:fld>
             <a:endParaRPr lang="en-US" dirty="0"/>
           </a:p>
@@ -13263,7 +13263,7 @@
           <a:p>
             <a:fld id="{F3B2EACC-4B66-4437-AFF4-9B644B9F00A8}" type="datetimeFigureOut">
               <a:rPr lang="en-GB" smtClean="0"/>
-              <a:t>18/05/2024</a:t>
+              <a:t>20/05/2024</a:t>
             </a:fld>
             <a:endParaRPr lang="en-GB"/>
           </a:p>
@@ -16137,7 +16137,7 @@
         <p:spPr>
           <a:xfrm>
             <a:off x="594360" y="1828800"/>
-            <a:ext cx="2377440" cy="2492990"/>
+            <a:ext cx="2377440" cy="3139321"/>
           </a:xfrm>
           <a:prstGeom prst="rect">
             <a:avLst/>
@@ -16156,7 +16156,7 @@
               </a:spcBef>
             </a:pPr>
             <a:r>
-              <a:rPr lang="en-US" sz="1800" dirty="0">
+              <a:rPr lang="en-US" sz="2400" dirty="0">
                 <a:solidFill>
                   <a:schemeClr val="bg1"/>
                 </a:solidFill>
@@ -16172,7 +16172,7 @@
               </a:spcBef>
             </a:pPr>
             <a:r>
-              <a:rPr lang="en-US" sz="1800" dirty="0">
+              <a:rPr lang="en-US" sz="2400" dirty="0">
                 <a:solidFill>
                   <a:schemeClr val="bg1"/>
                 </a:solidFill>
@@ -16188,13 +16188,13 @@
               </a:spcBef>
             </a:pPr>
             <a:r>
-              <a:rPr lang="en-US" sz="1800" dirty="0">
+              <a:rPr lang="en-US" sz="2400" dirty="0">
                 <a:solidFill>
                   <a:schemeClr val="bg1"/>
                 </a:solidFill>
                 <a:latin typeface="+mj-lt"/>
               </a:rPr>
-              <a:t>Contact Number:</a:t>
+              <a:t>Client:</a:t>
             </a:r>
           </a:p>
           <a:p>
@@ -16204,13 +16204,13 @@
               </a:spcBef>
             </a:pPr>
             <a:r>
-              <a:rPr lang="en-US" sz="1800" dirty="0">
+              <a:rPr lang="en-US" sz="2400" dirty="0">
                 <a:solidFill>
                   <a:schemeClr val="bg1"/>
                 </a:solidFill>
                 <a:latin typeface="+mj-lt"/>
               </a:rPr>
-              <a:t>E-mail:</a:t>
+              <a:t>Mobile:</a:t>
             </a:r>
           </a:p>
           <a:p>
@@ -16220,13 +16220,13 @@
               </a:spcBef>
             </a:pPr>
             <a:r>
-              <a:rPr lang="en-US" sz="1800" dirty="0">
+              <a:rPr lang="en-US" sz="2400" dirty="0">
                 <a:solidFill>
                   <a:schemeClr val="bg1"/>
                 </a:solidFill>
                 <a:latin typeface="+mj-lt"/>
               </a:rPr>
-              <a:t>Website:</a:t>
+              <a:t>E-mail:</a:t>
             </a:r>
           </a:p>
           <a:p>
@@ -16236,13 +16236,13 @@
               </a:spcBef>
             </a:pPr>
             <a:r>
-              <a:rPr lang="en-US" sz="1800" dirty="0">
+              <a:rPr lang="en-US" sz="2400" dirty="0">
                 <a:solidFill>
                   <a:schemeClr val="bg1"/>
                 </a:solidFill>
                 <a:latin typeface="+mj-lt"/>
               </a:rPr>
-              <a:t>Twitter:</a:t>
+              <a:t>Website:</a:t>
             </a:r>
           </a:p>
           <a:p>
@@ -16252,7 +16252,7 @@
               </a:spcBef>
             </a:pPr>
             <a:r>
-              <a:rPr lang="en-US" sz="1800" dirty="0">
+              <a:rPr lang="en-US" sz="2400" dirty="0">
                 <a:solidFill>
                   <a:schemeClr val="bg1"/>
                 </a:solidFill>
@@ -16260,12 +16260,6 @@
               </a:rPr>
               <a:t>LinkedIn:</a:t>
             </a:r>
-            <a:endParaRPr lang="en-US" dirty="0">
-              <a:solidFill>
-                <a:schemeClr val="bg1"/>
-              </a:solidFill>
-              <a:latin typeface="+mj-lt"/>
-            </a:endParaRPr>
           </a:p>
         </p:txBody>
       </p:sp>
@@ -17498,7 +17492,7 @@
         <p:spPr>
           <a:xfrm>
             <a:off x="596900" y="1645920"/>
-            <a:ext cx="11009313" cy="1500411"/>
+            <a:ext cx="11009313" cy="3000821"/>
           </a:xfrm>
         </p:spPr>
         <p:txBody>
@@ -17506,32 +17500,53 @@
           <a:lstStyle/>
           <a:p>
             <a:r>
-              <a:rPr lang="en-GB" sz="1800" dirty="0"/>
+              <a:rPr lang="en-GB" sz="2000" dirty="0"/>
               <a:t>Philip Mason has been a SAS programmer for 39 years, having spent 29 years as an independent SAS Consultant. Starting in Australia he then moved on to Europe working in Belgium, Netherlands and the U.K. where he is now based. He has written 3 books about SAS, and also written several SAS courses, founded some user groups, helped run </a:t>
             </a:r>
             <a:r>
-              <a:rPr lang="en-GB" sz="1800" dirty="0" err="1"/>
+              <a:rPr lang="en-GB" sz="2000" dirty="0" err="1"/>
               <a:t>Pharmasug</a:t>
             </a:r>
             <a:r>
-              <a:rPr lang="en-GB" sz="1800" dirty="0"/>
+              <a:rPr lang="en-GB" sz="2000" dirty="0"/>
               <a:t>, SAS Global Forum, VIEWS, SMUG, and so on.</a:t>
             </a:r>
           </a:p>
           <a:p>
             <a:r>
-              <a:rPr lang="en-GB" sz="1800" dirty="0"/>
+              <a:rPr lang="en-GB" sz="2000" dirty="0"/>
               <a:t>He currently works with SAS and JavaScript, helping a bio-tech called </a:t>
             </a:r>
             <a:r>
-              <a:rPr lang="en-GB" sz="1800" dirty="0" err="1"/>
+              <a:rPr lang="en-GB" sz="2000" dirty="0" err="1"/>
               <a:t>argenx</a:t>
             </a:r>
             <a:r>
-              <a:rPr lang="en-GB" sz="1800" dirty="0"/>
+              <a:rPr lang="en-GB" sz="2000" dirty="0"/>
               <a:t> in Ghent, Belgium. </a:t>
             </a:r>
-            <a:endParaRPr lang="en-US" dirty="0"/>
+          </a:p>
+          <a:p>
+            <a:r>
+              <a:rPr lang="en-GB" sz="2000" dirty="0"/>
+              <a:t>Phil’s wife is a Baptist minister, his eldest is a SAS programmer, daughter is a fashion industry merchandising manager and youngest just completed their Master of Maths </a:t>
+            </a:r>
+            <a:r>
+              <a:rPr lang="en-GB" sz="2000"/>
+              <a:t>at </a:t>
+            </a:r>
+            <a:br>
+              <a:rPr lang="en-GB" sz="2000"/>
+            </a:br>
+            <a:r>
+              <a:rPr lang="en-GB" sz="2000"/>
+              <a:t>Emmanuel </a:t>
+            </a:r>
+            <a:r>
+              <a:rPr lang="en-GB" sz="2000" dirty="0"/>
+              <a:t>College Cambridge University. </a:t>
+            </a:r>
+            <a:endParaRPr lang="en-US" sz="2000" dirty="0"/>
           </a:p>
         </p:txBody>
       </p:sp>
@@ -17594,6 +17609,35 @@
           <a:xfrm>
             <a:off x="9701213" y="4072316"/>
             <a:ext cx="1905000" cy="1905000"/>
+          </a:xfrm>
+          <a:prstGeom prst="rect">
+            <a:avLst/>
+          </a:prstGeom>
+        </p:spPr>
+      </p:pic>
+      <p:pic>
+        <p:nvPicPr>
+          <p:cNvPr id="4" name="Picture 3" descr="A group of people posing for a photo&#10;&#10;Description automatically generated">
+            <a:extLst>
+              <a:ext uri="{FF2B5EF4-FFF2-40B4-BE49-F238E27FC236}">
+                <a16:creationId xmlns:a16="http://schemas.microsoft.com/office/drawing/2014/main" id="{1E43334B-8F2D-7116-D13C-AF614CD8BF52}"/>
+              </a:ext>
+            </a:extLst>
+          </p:cNvPr>
+          <p:cNvPicPr>
+            <a:picLocks noChangeAspect="1"/>
+          </p:cNvPicPr>
+          <p:nvPr/>
+        </p:nvPicPr>
+        <p:blipFill rotWithShape="1">
+          <a:blip r:embed="rId4"/>
+          <a:srcRect l="13432" t="22746" r="19085" b="33263"/>
+          <a:stretch/>
+        </p:blipFill>
+        <p:spPr>
+          <a:xfrm>
+            <a:off x="585787" y="4800600"/>
+            <a:ext cx="3182072" cy="1555750"/>
           </a:xfrm>
           <a:prstGeom prst="rect">
             <a:avLst/>
@@ -17709,7 +17753,7 @@
             <a:r>
               <a:rPr lang="en-US" sz="1700" dirty="0">
                 <a:solidFill>
-                  <a:schemeClr val="accent1"/>
+                  <a:srgbClr val="00B050"/>
                 </a:solidFill>
               </a:rPr>
               <a:t>{</a:t>
@@ -17733,7 +17777,7 @@
             <a:r>
               <a:rPr lang="en-US" sz="1700" dirty="0">
                 <a:solidFill>
-                  <a:schemeClr val="accent1"/>
+                  <a:srgbClr val="00B050"/>
                 </a:solidFill>
               </a:rPr>
               <a:t>"</a:t>
@@ -17741,7 +17785,7 @@
             <a:r>
               <a:rPr lang="en-US" sz="1700" b="1" dirty="0">
                 <a:solidFill>
-                  <a:schemeClr val="accent1"/>
+                  <a:srgbClr val="00B050"/>
                 </a:solidFill>
               </a:rPr>
               <a:t>description</a:t>
@@ -17749,7 +17793,7 @@
             <a:r>
               <a:rPr lang="en-US" sz="1700" dirty="0">
                 <a:solidFill>
-                  <a:schemeClr val="accent1"/>
+                  <a:srgbClr val="00B050"/>
                 </a:solidFill>
               </a:rPr>
               <a:t>": "Look for paths to a file or directory starting with http. Then create a link to it.",</a:t>
@@ -17773,7 +17817,7 @@
             <a:r>
               <a:rPr lang="en-US" sz="1700" dirty="0">
                 <a:solidFill>
-                  <a:schemeClr val="accent1"/>
+                  <a:srgbClr val="00B050"/>
                 </a:solidFill>
               </a:rPr>
               <a:t>"</a:t>
@@ -17781,7 +17825,7 @@
             <a:r>
               <a:rPr lang="en-US" sz="1700" b="1" dirty="0" err="1">
                 <a:solidFill>
-                  <a:schemeClr val="accent1"/>
+                  <a:srgbClr val="00B050"/>
                 </a:solidFill>
               </a:rPr>
               <a:t>ruleType</a:t>
@@ -17789,7 +17833,7 @@
             <a:r>
               <a:rPr lang="en-US" sz="1700" dirty="0">
                 <a:solidFill>
-                  <a:schemeClr val="accent1"/>
+                  <a:srgbClr val="00B050"/>
                 </a:solidFill>
               </a:rPr>
               <a:t>": "regex",</a:t>
@@ -17813,7 +17857,7 @@
             <a:r>
               <a:rPr lang="en-US" sz="1700" dirty="0">
                 <a:solidFill>
-                  <a:schemeClr val="accent1"/>
+                  <a:srgbClr val="00B050"/>
                 </a:solidFill>
               </a:rPr>
               <a:t>"</a:t>
@@ -17821,7 +17865,7 @@
             <a:r>
               <a:rPr lang="en-US" sz="1700" b="1" dirty="0">
                 <a:solidFill>
-                  <a:schemeClr val="accent1"/>
+                  <a:srgbClr val="00B050"/>
                 </a:solidFill>
               </a:rPr>
               <a:t>regex</a:t>
@@ -17829,7 +17873,7 @@
             <a:r>
               <a:rPr lang="en-US" sz="1700" dirty="0">
                 <a:solidFill>
-                  <a:schemeClr val="accent1"/>
+                  <a:srgbClr val="00B050"/>
                 </a:solidFill>
               </a:rPr>
               <a:t>": "</a:t>
@@ -17837,7 +17881,7 @@
             <a:r>
               <a:rPr lang="en-US" sz="1700" dirty="0">
                 <a:solidFill>
-                  <a:schemeClr val="accent1"/>
+                  <a:srgbClr val="00B050"/>
                 </a:solidFill>
                 <a:highlight>
                   <a:srgbClr val="FFFF00"/>
@@ -17848,7 +17892,7 @@
             <a:r>
               <a:rPr lang="en-US" sz="1700" dirty="0">
                 <a:solidFill>
-                  <a:schemeClr val="accent1"/>
+                  <a:srgbClr val="00B050"/>
                 </a:solidFill>
               </a:rPr>
               <a:t>",</a:t>
@@ -17872,7 +17916,7 @@
             <a:r>
               <a:rPr lang="en-US" sz="1700" dirty="0">
                 <a:solidFill>
-                  <a:schemeClr val="accent1"/>
+                  <a:srgbClr val="00B050"/>
                 </a:solidFill>
               </a:rPr>
               <a:t>"</a:t>
@@ -17880,7 +17924,7 @@
             <a:r>
               <a:rPr lang="en-US" sz="1700" b="1" dirty="0">
                 <a:solidFill>
-                  <a:schemeClr val="accent1"/>
+                  <a:srgbClr val="00B050"/>
                 </a:solidFill>
               </a:rPr>
               <a:t>prefix</a:t>
@@ -17888,7 +17932,7 @@
             <a:r>
               <a:rPr lang="en-US" sz="1700" dirty="0">
                 <a:solidFill>
-                  <a:schemeClr val="accent1"/>
+                  <a:srgbClr val="00B050"/>
                 </a:solidFill>
               </a:rPr>
               <a:t>": "&lt;a </a:t>
@@ -17896,7 +17940,7 @@
             <a:r>
               <a:rPr lang="en-US" sz="1700" dirty="0" err="1">
                 <a:solidFill>
-                  <a:schemeClr val="accent1"/>
+                  <a:srgbClr val="00B050"/>
                 </a:solidFill>
               </a:rPr>
               <a:t>href</a:t>
@@ -17904,7 +17948,7 @@
             <a:r>
               <a:rPr lang="en-US" sz="1700" dirty="0">
                 <a:solidFill>
-                  <a:schemeClr val="accent1"/>
+                  <a:srgbClr val="00B050"/>
                 </a:solidFill>
               </a:rPr>
               <a:t>='</a:t>
@@ -17912,7 +17956,7 @@
             <a:r>
               <a:rPr lang="en-US" sz="1700" dirty="0">
                 <a:solidFill>
-                  <a:schemeClr val="accent1"/>
+                  <a:srgbClr val="00B050"/>
                 </a:solidFill>
                 <a:highlight>
                   <a:srgbClr val="FFFF00"/>
@@ -17923,7 +17967,7 @@
             <a:r>
               <a:rPr lang="en-US" sz="1700" dirty="0">
                 <a:solidFill>
-                  <a:schemeClr val="accent1"/>
+                  <a:srgbClr val="00B050"/>
                 </a:solidFill>
               </a:rPr>
               <a:t>' target='_blank'&gt;",</a:t>
@@ -17947,7 +17991,7 @@
             <a:r>
               <a:rPr lang="en-US" sz="1700" dirty="0">
                 <a:solidFill>
-                  <a:schemeClr val="accent1"/>
+                  <a:srgbClr val="00B050"/>
                 </a:solidFill>
               </a:rPr>
               <a:t>"</a:t>
@@ -17955,7 +17999,7 @@
             <a:r>
               <a:rPr lang="en-US" sz="1700" b="1" dirty="0">
                 <a:solidFill>
-                  <a:schemeClr val="accent1"/>
+                  <a:srgbClr val="00B050"/>
                 </a:solidFill>
               </a:rPr>
               <a:t>suffix</a:t>
@@ -17963,7 +18007,7 @@
             <a:r>
               <a:rPr lang="en-US" sz="1700" dirty="0">
                 <a:solidFill>
-                  <a:schemeClr val="accent1"/>
+                  <a:srgbClr val="00B050"/>
                 </a:solidFill>
               </a:rPr>
               <a:t>": "</a:t>
@@ -17971,7 +18015,7 @@
             <a:r>
               <a:rPr lang="en-US" sz="1700" dirty="0">
                 <a:solidFill>
-                  <a:schemeClr val="accent1"/>
+                  <a:srgbClr val="00B050"/>
                 </a:solidFill>
                 <a:highlight>
                   <a:srgbClr val="FFFF00"/>
@@ -17982,7 +18026,7 @@
             <a:r>
               <a:rPr lang="en-US" sz="1700" dirty="0">
                 <a:solidFill>
-                  <a:schemeClr val="accent1"/>
+                  <a:srgbClr val="00B050"/>
                 </a:solidFill>
               </a:rPr>
               <a:t>&lt;/a&gt;",</a:t>
@@ -18006,7 +18050,7 @@
             <a:r>
               <a:rPr lang="en-US" sz="1700" dirty="0">
                 <a:solidFill>
-                  <a:schemeClr val="accent1"/>
+                  <a:srgbClr val="00B050"/>
                 </a:solidFill>
               </a:rPr>
               <a:t>"</a:t>
@@ -18014,7 +18058,7 @@
             <a:r>
               <a:rPr lang="en-US" sz="1700" b="1" dirty="0">
                 <a:solidFill>
-                  <a:schemeClr val="accent1"/>
+                  <a:srgbClr val="00B050"/>
                 </a:solidFill>
               </a:rPr>
               <a:t>anchor</a:t>
@@ -18022,7 +18066,7 @@
             <a:r>
               <a:rPr lang="en-US" sz="1700" dirty="0">
                 <a:solidFill>
-                  <a:schemeClr val="accent1"/>
+                  <a:srgbClr val="00B050"/>
                 </a:solidFill>
               </a:rPr>
               <a:t>": false,</a:t>
@@ -18046,7 +18090,7 @@
             <a:r>
               <a:rPr lang="en-US" sz="1700" dirty="0">
                 <a:solidFill>
-                  <a:schemeClr val="accent1"/>
+                  <a:srgbClr val="00B050"/>
                 </a:solidFill>
               </a:rPr>
               <a:t>"</a:t>
@@ -18054,7 +18098,7 @@
             <a:r>
               <a:rPr lang="en-US" sz="1700" b="1" dirty="0" err="1">
                 <a:solidFill>
-                  <a:schemeClr val="accent1"/>
+                  <a:srgbClr val="00B050"/>
                 </a:solidFill>
               </a:rPr>
               <a:t>linkColor</a:t>
@@ -18062,7 +18106,7 @@
             <a:r>
               <a:rPr lang="en-US" sz="1700" dirty="0">
                 <a:solidFill>
-                  <a:schemeClr val="accent1"/>
+                  <a:srgbClr val="00B050"/>
                 </a:solidFill>
               </a:rPr>
               <a:t>": "blue",</a:t>
@@ -18086,7 +18130,7 @@
             <a:r>
               <a:rPr lang="en-US" sz="1700" dirty="0">
                 <a:solidFill>
-                  <a:schemeClr val="accent1"/>
+                  <a:srgbClr val="00B050"/>
                 </a:solidFill>
               </a:rPr>
               <a:t>"</a:t>
@@ -18094,7 +18138,7 @@
             <a:r>
               <a:rPr lang="en-US" sz="1700" b="1" dirty="0">
                 <a:solidFill>
-                  <a:schemeClr val="accent1"/>
+                  <a:srgbClr val="00B050"/>
                 </a:solidFill>
               </a:rPr>
               <a:t>type</a:t>
@@ -18102,7 +18146,7 @@
             <a:r>
               <a:rPr lang="en-US" sz="1700" dirty="0">
                 <a:solidFill>
-                  <a:schemeClr val="accent1"/>
+                  <a:srgbClr val="00B050"/>
                 </a:solidFill>
               </a:rPr>
               <a:t>": "FILE",</a:t>
@@ -18126,7 +18170,7 @@
             <a:r>
               <a:rPr lang="en-US" sz="1700" dirty="0">
                 <a:solidFill>
-                  <a:schemeClr val="accent1"/>
+                  <a:srgbClr val="00B050"/>
                 </a:solidFill>
               </a:rPr>
               <a:t>"</a:t>
@@ -18134,7 +18178,7 @@
             <a:r>
               <a:rPr lang="en-US" sz="1700" b="1" dirty="0">
                 <a:solidFill>
-                  <a:schemeClr val="accent1"/>
+                  <a:srgbClr val="00B050"/>
                 </a:solidFill>
               </a:rPr>
               <a:t>interesting</a:t>
@@ -18142,7 +18186,7 @@
             <a:r>
               <a:rPr lang="en-US" sz="1700" dirty="0">
                 <a:solidFill>
-                  <a:schemeClr val="accent1"/>
+                  <a:srgbClr val="00B050"/>
                 </a:solidFill>
               </a:rPr>
               <a:t>": false,</a:t>
@@ -18166,7 +18210,7 @@
             <a:r>
               <a:rPr lang="en-US" sz="1700" dirty="0">
                 <a:solidFill>
-                  <a:schemeClr val="accent1"/>
+                  <a:srgbClr val="00B050"/>
                 </a:solidFill>
               </a:rPr>
               <a:t>"</a:t>
@@ -18174,7 +18218,7 @@
             <a:r>
               <a:rPr lang="en-US" sz="1700" b="1" dirty="0">
                 <a:solidFill>
-                  <a:schemeClr val="accent1"/>
+                  <a:srgbClr val="00B050"/>
                 </a:solidFill>
               </a:rPr>
               <a:t>substitute</a:t>
@@ -18182,7 +18226,7 @@
             <a:r>
               <a:rPr lang="en-US" sz="1700" dirty="0">
                 <a:solidFill>
-                  <a:schemeClr val="accent1"/>
+                  <a:srgbClr val="00B050"/>
                 </a:solidFill>
               </a:rPr>
               <a:t>": true</a:t>
@@ -18206,7 +18250,7 @@
             <a:r>
               <a:rPr lang="en-US" sz="1700" dirty="0">
                 <a:solidFill>
-                  <a:schemeClr val="accent1"/>
+                  <a:srgbClr val="00B050"/>
                 </a:solidFill>
               </a:rPr>
               <a:t>  }</a:t>
@@ -19454,7 +19498,7 @@
             <a:r>
               <a:rPr lang="en-US" sz="2000" b="1" dirty="0">
                 <a:solidFill>
-                  <a:schemeClr val="accent1"/>
+                  <a:srgbClr val="00B050"/>
                 </a:solidFill>
               </a:rPr>
               <a:t>Dataset is created containing results - </a:t>
@@ -19462,14 +19506,14 @@
             <a:r>
               <a:rPr lang="en-US" sz="2000" b="1" dirty="0" err="1">
                 <a:solidFill>
-                  <a:schemeClr val="accent1"/>
+                  <a:srgbClr val="00B050"/>
                 </a:solidFill>
               </a:rPr>
               <a:t>fileCheckWithRules</a:t>
             </a:r>
             <a:endParaRPr lang="en-US" sz="2000" b="1" dirty="0">
               <a:solidFill>
-                <a:schemeClr val="accent1"/>
+                <a:srgbClr val="00B050"/>
               </a:solidFill>
             </a:endParaRPr>
           </a:p>
@@ -19490,7 +19534,7 @@
             <a:r>
               <a:rPr lang="en-US" sz="2000" b="1" dirty="0">
                 <a:solidFill>
-                  <a:schemeClr val="accent1"/>
+                  <a:srgbClr val="00B050"/>
                 </a:solidFill>
               </a:rPr>
               <a:t>Macro variable returned with the number of rows in dataset</a:t>
@@ -19513,7 +19557,7 @@
             <a:r>
               <a:rPr lang="en-US" sz="2000" b="1" dirty="0">
                 <a:solidFill>
-                  <a:schemeClr val="accent1"/>
+                  <a:srgbClr val="00B050"/>
                 </a:solidFill>
               </a:rPr>
               <a:t>Allows checking in a program if anything was found</a:t>
@@ -19536,7 +19580,7 @@
             <a:r>
               <a:rPr lang="en-US" sz="2000" b="1" dirty="0">
                 <a:solidFill>
-                  <a:schemeClr val="accent1"/>
+                  <a:srgbClr val="00B050"/>
                 </a:solidFill>
               </a:rPr>
               <a:t>HTML report is generated</a:t>
@@ -20891,14 +20935,26 @@
               <a:buChar char="•"/>
             </a:pPr>
             <a:r>
-              <a:rPr lang="en-GB" dirty="0"/>
+              <a:rPr lang="en-GB" dirty="0">
+                <a:solidFill>
+                  <a:srgbClr val="00B050"/>
+                </a:solidFill>
+              </a:rPr>
               <a:t>Select rules and log to </a:t>
             </a:r>
             <a:r>
-              <a:rPr lang="en-GB" dirty="0" err="1"/>
+              <a:rPr lang="en-GB" dirty="0" err="1">
+                <a:solidFill>
+                  <a:srgbClr val="00B050"/>
+                </a:solidFill>
+              </a:rPr>
               <a:t>analyze</a:t>
             </a:r>
-            <a:endParaRPr lang="en-GB" dirty="0"/>
+            <a:endParaRPr lang="en-GB" dirty="0">
+              <a:solidFill>
+                <a:srgbClr val="00B050"/>
+              </a:solidFill>
+            </a:endParaRPr>
           </a:p>
           <a:p>
             <a:pPr marL="342900" indent="-342900">
@@ -20906,7 +20962,11 @@
               <a:buChar char="•"/>
             </a:pPr>
             <a:r>
-              <a:rPr lang="en-GB" dirty="0"/>
+              <a:rPr lang="en-GB" dirty="0">
+                <a:solidFill>
+                  <a:srgbClr val="00B050"/>
+                </a:solidFill>
+              </a:rPr>
               <a:t>Display log with styles applied</a:t>
             </a:r>
           </a:p>
@@ -20916,7 +20976,11 @@
               <a:buChar char="•"/>
             </a:pPr>
             <a:r>
-              <a:rPr lang="en-GB" dirty="0"/>
+              <a:rPr lang="en-GB" dirty="0">
+                <a:solidFill>
+                  <a:srgbClr val="00B050"/>
+                </a:solidFill>
+              </a:rPr>
               <a:t>Summarize results of analysis</a:t>
             </a:r>
           </a:p>
@@ -20926,7 +20990,11 @@
               <a:buChar char="•"/>
             </a:pPr>
             <a:r>
-              <a:rPr lang="en-GB" dirty="0"/>
+              <a:rPr lang="en-GB" dirty="0">
+                <a:solidFill>
+                  <a:srgbClr val="00B050"/>
+                </a:solidFill>
+              </a:rPr>
               <a:t>Jump from summary to related point in log</a:t>
             </a:r>
           </a:p>
@@ -20936,7 +21004,11 @@
               <a:buChar char="•"/>
             </a:pPr>
             <a:r>
-              <a:rPr lang="en-GB" dirty="0"/>
+              <a:rPr lang="en-GB" dirty="0">
+                <a:solidFill>
+                  <a:srgbClr val="00B050"/>
+                </a:solidFill>
+              </a:rPr>
               <a:t>Nice to haves</a:t>
             </a:r>
           </a:p>
@@ -20946,7 +21018,11 @@
               <a:buChar char="•"/>
             </a:pPr>
             <a:r>
-              <a:rPr lang="en-GB" dirty="0"/>
+              <a:rPr lang="en-GB" dirty="0">
+                <a:solidFill>
+                  <a:srgbClr val="00B050"/>
+                </a:solidFill>
+              </a:rPr>
               <a:t>Performance info</a:t>
             </a:r>
           </a:p>
@@ -20956,7 +21032,11 @@
               <a:buChar char="•"/>
             </a:pPr>
             <a:r>
-              <a:rPr lang="en-GB" dirty="0"/>
+              <a:rPr lang="en-GB" dirty="0">
+                <a:solidFill>
+                  <a:srgbClr val="00B050"/>
+                </a:solidFill>
+              </a:rPr>
               <a:t>Macros used</a:t>
             </a:r>
           </a:p>
@@ -20966,15 +21046,27 @@
               <a:buChar char="•"/>
             </a:pPr>
             <a:r>
-              <a:rPr lang="en-GB" dirty="0"/>
+              <a:rPr lang="en-GB" dirty="0">
+                <a:solidFill>
+                  <a:srgbClr val="00B050"/>
+                </a:solidFill>
+              </a:rPr>
               <a:t>Turn off </a:t>
             </a:r>
             <a:r>
-              <a:rPr lang="en-GB" dirty="0" err="1"/>
+              <a:rPr lang="en-GB" dirty="0" err="1">
+                <a:solidFill>
+                  <a:srgbClr val="00B050"/>
+                </a:solidFill>
+              </a:rPr>
               <a:t>mprint</a:t>
             </a:r>
             <a:r>
-              <a:rPr lang="en-GB" dirty="0"/>
+              <a:rPr lang="en-GB" dirty="0">
+                <a:solidFill>
+                  <a:srgbClr val="00B050"/>
+                </a:solidFill>
+              </a:rPr>
               <a:t> lines (reduce clutter)</a:t>
             </a:r>
           </a:p>
@@ -21249,7 +21341,7 @@
             <a:r>
               <a:rPr lang="en-GB" dirty="0">
                 <a:solidFill>
-                  <a:schemeClr val="accent1"/>
+                  <a:srgbClr val="00B050"/>
                 </a:solidFill>
               </a:rPr>
               <a:t>Email about this log</a:t>
@@ -21263,7 +21355,7 @@
             <a:r>
               <a:rPr lang="en-GB" dirty="0">
                 <a:solidFill>
-                  <a:schemeClr val="accent1"/>
+                  <a:srgbClr val="00B050"/>
                 </a:solidFill>
               </a:rPr>
               <a:t>Refresh</a:t>
@@ -21277,7 +21369,7 @@
             <a:r>
               <a:rPr lang="en-GB" dirty="0">
                 <a:solidFill>
-                  <a:schemeClr val="accent1"/>
+                  <a:srgbClr val="00B050"/>
                 </a:solidFill>
               </a:rPr>
               <a:t>Resize manually</a:t>
@@ -21291,7 +21383,7 @@
             <a:r>
               <a:rPr lang="en-GB" dirty="0">
                 <a:solidFill>
-                  <a:schemeClr val="accent1"/>
+                  <a:srgbClr val="00B050"/>
                 </a:solidFill>
               </a:rPr>
               <a:t>Next/Previous</a:t>
@@ -21305,7 +21397,7 @@
             <a:r>
               <a:rPr lang="en-GB" dirty="0">
                 <a:solidFill>
-                  <a:schemeClr val="accent1"/>
+                  <a:srgbClr val="00B050"/>
                 </a:solidFill>
               </a:rPr>
               <a:t>Page</a:t>
@@ -21319,7 +21411,7 @@
             <a:r>
               <a:rPr lang="en-GB" dirty="0">
                 <a:solidFill>
-                  <a:schemeClr val="accent1"/>
+                  <a:srgbClr val="00B050"/>
                 </a:solidFill>
               </a:rPr>
               <a:t>Interesting thing</a:t>
@@ -21333,7 +21425,7 @@
             <a:r>
               <a:rPr lang="en-GB" dirty="0">
                 <a:solidFill>
-                  <a:schemeClr val="accent1"/>
+                  <a:srgbClr val="00B050"/>
                 </a:solidFill>
               </a:rPr>
               <a:t>Error</a:t>
@@ -21347,7 +21439,7 @@
             <a:r>
               <a:rPr lang="en-GB" dirty="0">
                 <a:solidFill>
-                  <a:schemeClr val="accent1"/>
+                  <a:srgbClr val="00B050"/>
                 </a:solidFill>
               </a:rPr>
               <a:t>Warning</a:t>
@@ -21361,7 +21453,7 @@
             <a:r>
               <a:rPr lang="en-GB" dirty="0">
                 <a:solidFill>
-                  <a:schemeClr val="accent1"/>
+                  <a:srgbClr val="00B050"/>
                 </a:solidFill>
               </a:rPr>
               <a:t>Search, find next/previous</a:t>
@@ -21375,7 +21467,7 @@
             <a:r>
               <a:rPr lang="en-GB" dirty="0">
                 <a:solidFill>
-                  <a:schemeClr val="accent1"/>
+                  <a:srgbClr val="00B050"/>
                 </a:solidFill>
               </a:rPr>
               <a:t>Info &amp; Documentation</a:t>
@@ -21386,7 +21478,11 @@
               <a:buFont typeface="Arial" panose="020B0604020202020204" pitchFamily="34" charset="0"/>
               <a:buChar char="•"/>
             </a:pPr>
-            <a:endParaRPr lang="en-GB" dirty="0"/>
+            <a:endParaRPr lang="en-GB" dirty="0">
+              <a:solidFill>
+                <a:srgbClr val="00B050"/>
+              </a:solidFill>
+            </a:endParaRPr>
           </a:p>
         </p:txBody>
       </p:sp>
@@ -21423,7 +21519,11 @@
               <a:buChar char="•"/>
             </a:pPr>
             <a:r>
-              <a:rPr lang="en-GB" b="0" dirty="0"/>
+              <a:rPr lang="en-GB" b="0" dirty="0">
+                <a:solidFill>
+                  <a:srgbClr val="00B050"/>
+                </a:solidFill>
+              </a:rPr>
               <a:t>Resize panels</a:t>
             </a:r>
           </a:p>
@@ -21433,7 +21533,11 @@
               <a:buChar char="•"/>
             </a:pPr>
             <a:r>
-              <a:rPr lang="en-GB" b="0" dirty="0"/>
+              <a:rPr lang="en-GB" b="0" dirty="0">
+                <a:solidFill>
+                  <a:srgbClr val="00B050"/>
+                </a:solidFill>
+              </a:rPr>
               <a:t>Resize fonts</a:t>
             </a:r>
           </a:p>
@@ -21443,7 +21547,11 @@
               <a:buChar char="•"/>
             </a:pPr>
             <a:r>
-              <a:rPr lang="en-GB" b="0" dirty="0"/>
+              <a:rPr lang="en-GB" b="0" dirty="0">
+                <a:solidFill>
+                  <a:srgbClr val="00B050"/>
+                </a:solidFill>
+              </a:rPr>
               <a:t>Show/Hide</a:t>
             </a:r>
           </a:p>
@@ -21455,7 +21563,7 @@
             <a:r>
               <a:rPr lang="en-GB" dirty="0">
                 <a:solidFill>
-                  <a:schemeClr val="accent1"/>
+                  <a:srgbClr val="00B050"/>
                 </a:solidFill>
               </a:rPr>
               <a:t>Source code</a:t>
@@ -21469,7 +21577,7 @@
             <a:r>
               <a:rPr lang="en-GB" dirty="0">
                 <a:solidFill>
-                  <a:schemeClr val="accent1"/>
+                  <a:srgbClr val="00B050"/>
                 </a:solidFill>
               </a:rPr>
               <a:t>Macro lines</a:t>
@@ -21483,7 +21591,7 @@
             <a:r>
               <a:rPr lang="en-GB" dirty="0">
                 <a:solidFill>
-                  <a:schemeClr val="accent1"/>
+                  <a:srgbClr val="00B050"/>
                 </a:solidFill>
               </a:rPr>
               <a:t>Line numbers</a:t>
@@ -21497,7 +21605,7 @@
             <a:r>
               <a:rPr lang="en-GB" dirty="0">
                 <a:solidFill>
-                  <a:schemeClr val="accent1"/>
+                  <a:srgbClr val="00B050"/>
                 </a:solidFill>
               </a:rPr>
               <a:t>Data Flow Diagram</a:t>
@@ -21511,7 +21619,7 @@
             <a:r>
               <a:rPr lang="en-GB" dirty="0">
                 <a:solidFill>
-                  <a:schemeClr val="accent1"/>
+                  <a:srgbClr val="00B050"/>
                 </a:solidFill>
               </a:rPr>
               <a:t>Choose/View rules</a:t>
@@ -21525,7 +21633,7 @@
             <a:r>
               <a:rPr lang="en-GB" dirty="0">
                 <a:solidFill>
-                  <a:schemeClr val="accent1"/>
+                  <a:srgbClr val="00B050"/>
                 </a:solidFill>
               </a:rPr>
               <a:t>Copy source code</a:t>
@@ -21539,7 +21647,7 @@
             <a:r>
               <a:rPr lang="en-GB" dirty="0">
                 <a:solidFill>
-                  <a:schemeClr val="accent1"/>
+                  <a:srgbClr val="00B050"/>
                 </a:solidFill>
               </a:rPr>
               <a:t>Paste a log</a:t>
@@ -21552,7 +21660,7 @@
             </a:pPr>
             <a:endParaRPr lang="en-GB" dirty="0">
               <a:solidFill>
-                <a:schemeClr val="accent1"/>
+                <a:srgbClr val="00B050"/>
               </a:solidFill>
             </a:endParaRPr>
           </a:p>
@@ -21561,7 +21669,11 @@
               <a:buFont typeface="Arial" panose="020B0604020202020204" pitchFamily="34" charset="0"/>
               <a:buChar char="•"/>
             </a:pPr>
-            <a:endParaRPr lang="en-GB" b="0" dirty="0"/>
+            <a:endParaRPr lang="en-GB" b="0" dirty="0">
+              <a:solidFill>
+                <a:srgbClr val="00B050"/>
+              </a:solidFill>
+            </a:endParaRPr>
           </a:p>
         </p:txBody>
       </p:sp>
@@ -21853,7 +21965,7 @@
           <a:p>
             <a:r>
               <a:rPr lang="en-GB" dirty="0"/>
-              <a:t>Look at log viewer at SAS stand</a:t>
+              <a:t>See me if you would like to look at the Log Viewer</a:t>
             </a:r>
           </a:p>
         </p:txBody>
@@ -21955,7 +22067,7 @@
         <p:spPr>
           <a:xfrm>
             <a:off x="596239" y="1280159"/>
-            <a:ext cx="11009973" cy="2000548"/>
+            <a:ext cx="11009973" cy="4116512"/>
           </a:xfrm>
         </p:spPr>
         <p:txBody>
@@ -21967,7 +22079,11 @@
               <a:buChar char="•"/>
             </a:pPr>
             <a:r>
-              <a:rPr lang="en-GB" b="0" dirty="0"/>
+              <a:rPr lang="en-GB" b="0" dirty="0">
+                <a:solidFill>
+                  <a:srgbClr val="00B050"/>
+                </a:solidFill>
+              </a:rPr>
               <a:t>Bookmarklet to automate from LSAF</a:t>
             </a:r>
           </a:p>
@@ -21977,7 +22093,11 @@
               <a:buChar char="•"/>
             </a:pPr>
             <a:r>
-              <a:rPr lang="en-GB" b="0" dirty="0"/>
+              <a:rPr lang="en-GB" b="0" dirty="0">
+                <a:solidFill>
+                  <a:srgbClr val="00B050"/>
+                </a:solidFill>
+              </a:rPr>
               <a:t>Tool definition to automate from PC SAS</a:t>
             </a:r>
           </a:p>
@@ -22020,21 +22140,78 @@
                   <a:srgbClr val="FFC000"/>
                 </a:solidFill>
               </a:rPr>
-              <a:t>Electron version making native Linux, Windows &amp; </a:t>
-            </a:r>
-            <a:r>
-              <a:rPr lang="en-GB" b="0">
+              <a:t>Electron version making native Linux, Windows &amp; Mac applications</a:t>
+            </a:r>
+          </a:p>
+          <a:p>
+            <a:pPr marL="342900" indent="-342900">
+              <a:buFont typeface="Arial" panose="020B0604020202020204" pitchFamily="34" charset="0"/>
+              <a:buChar char="•"/>
+            </a:pPr>
+            <a:r>
+              <a:rPr lang="en-GB" b="0" dirty="0">
                 <a:solidFill>
                   <a:srgbClr val="FFC000"/>
                 </a:solidFill>
               </a:rPr>
-              <a:t>Mac applications</a:t>
-            </a:r>
-            <a:endParaRPr lang="en-GB" b="0" dirty="0">
-              <a:solidFill>
-                <a:srgbClr val="FFC000"/>
-              </a:solidFill>
-            </a:endParaRPr>
+              <a:t>Creating reports on log analysis for PDF and Word</a:t>
+            </a:r>
+          </a:p>
+          <a:p>
+            <a:pPr marL="342900" indent="-342900">
+              <a:buFont typeface="Arial" panose="020B0604020202020204" pitchFamily="34" charset="0"/>
+              <a:buChar char="•"/>
+            </a:pPr>
+            <a:r>
+              <a:rPr lang="en-GB" b="0" dirty="0">
+                <a:solidFill>
+                  <a:srgbClr val="FFC000"/>
+                </a:solidFill>
+              </a:rPr>
+              <a:t>Improve integration with other SAS clients: EG, Studio, Viya</a:t>
+            </a:r>
+          </a:p>
+          <a:p>
+            <a:pPr marL="342900" indent="-342900">
+              <a:buFont typeface="Arial" panose="020B0604020202020204" pitchFamily="34" charset="0"/>
+              <a:buChar char="•"/>
+            </a:pPr>
+            <a:r>
+              <a:rPr lang="en-GB" b="0" dirty="0">
+                <a:solidFill>
+                  <a:srgbClr val="FFC000"/>
+                </a:solidFill>
+              </a:rPr>
+              <a:t>Rules to support R &amp; Python</a:t>
+            </a:r>
+          </a:p>
+          <a:p>
+            <a:pPr marL="342900" indent="-342900">
+              <a:buFont typeface="Arial" panose="020B0604020202020204" pitchFamily="34" charset="0"/>
+              <a:buChar char="•"/>
+            </a:pPr>
+            <a:r>
+              <a:rPr lang="en-GB" b="0" dirty="0">
+                <a:solidFill>
+                  <a:srgbClr val="FFC000"/>
+                </a:solidFill>
+              </a:rPr>
+              <a:t>Integrate search into links on left panel</a:t>
+            </a:r>
+          </a:p>
+          <a:p>
+            <a:pPr marL="342900" indent="-342900">
+              <a:buFont typeface="Arial" panose="020B0604020202020204" pitchFamily="34" charset="0"/>
+              <a:buChar char="•"/>
+            </a:pPr>
+            <a:r>
+              <a:rPr lang="en-GB" b="0" dirty="0">
+                <a:solidFill>
+                  <a:srgbClr val="FFC000"/>
+                </a:solidFill>
+              </a:rPr>
+              <a:t>Generalise bottom left logic to work with anything, e.g. R log stats</a:t>
+            </a:r>
           </a:p>
         </p:txBody>
       </p:sp>
@@ -22113,16 +22290,21 @@
             <p:ph type="ftr" sz="quarter" idx="10"/>
           </p:nvPr>
         </p:nvSpPr>
-        <p:spPr/>
+        <p:spPr>
+          <a:xfrm>
+            <a:off x="1508760" y="6356350"/>
+            <a:ext cx="1152566" cy="365125"/>
+          </a:xfrm>
+        </p:spPr>
         <p:txBody>
           <a:bodyPr/>
           <a:lstStyle/>
           <a:p>
             <a:r>
-              <a:rPr lang="en-US"/>
+              <a:rPr lang="en-US" sz="1000"/>
               <a:t>DS-109</a:t>
             </a:r>
-            <a:endParaRPr lang="en-US" dirty="0"/>
+            <a:endParaRPr lang="en-US" sz="1000" dirty="0"/>
           </a:p>
         </p:txBody>
       </p:sp>
@@ -22145,7 +22327,7 @@
         <p:spPr>
           <a:xfrm>
             <a:off x="3200396" y="1828799"/>
-            <a:ext cx="6766563" cy="2400657"/>
+            <a:ext cx="8623304" cy="3493264"/>
           </a:xfrm>
         </p:spPr>
         <p:txBody>
@@ -22153,52 +22335,141 @@
           <a:lstStyle/>
           <a:p>
             <a:r>
-              <a:rPr lang="en-US" dirty="0"/>
+              <a:rPr lang="en-US" sz="2400" dirty="0">
+                <a:solidFill>
+                  <a:srgbClr val="FFFF00"/>
+                </a:solidFill>
+              </a:rPr>
               <a:t>Philip Mason</a:t>
             </a:r>
           </a:p>
           <a:p>
             <a:r>
-              <a:rPr lang="en-US" dirty="0"/>
+              <a:rPr lang="en-US" sz="2400" dirty="0">
+                <a:solidFill>
+                  <a:srgbClr val="FFFF00"/>
+                </a:solidFill>
+              </a:rPr>
               <a:t>Wood Street Consultants Ltd.</a:t>
             </a:r>
           </a:p>
           <a:p>
-            <a:endParaRPr lang="en-US" dirty="0"/>
-          </a:p>
-          <a:p>
+            <a:r>
+              <a:rPr lang="en-US" sz="2400" dirty="0" err="1">
+                <a:solidFill>
+                  <a:srgbClr val="FFFF00"/>
+                </a:solidFill>
+              </a:rPr>
+              <a:t>Argenx</a:t>
+            </a:r>
+            <a:r>
+              <a:rPr lang="en-US" sz="2400" dirty="0">
+                <a:solidFill>
+                  <a:srgbClr val="FFFF00"/>
+                </a:solidFill>
+              </a:rPr>
+              <a:t> </a:t>
+            </a:r>
             <a:r>
               <a:rPr lang="en-US" dirty="0">
-                <a:hlinkClick r:id="rId3"/>
+                <a:solidFill>
+                  <a:srgbClr val="FFFF00"/>
+                </a:solidFill>
+              </a:rPr>
+              <a:t>(bio-tech based in Belgium)</a:t>
+            </a:r>
+            <a:endParaRPr lang="en-US" sz="2400" dirty="0">
+              <a:solidFill>
+                <a:srgbClr val="FFFF00"/>
+              </a:solidFill>
+            </a:endParaRPr>
+          </a:p>
+          <a:p>
+            <a:r>
+              <a:rPr lang="en-US" sz="2400" dirty="0">
+                <a:solidFill>
+                  <a:srgbClr val="FFFF00"/>
+                </a:solidFill>
+              </a:rPr>
+              <a:t>+44 7465 748624‬</a:t>
+            </a:r>
+          </a:p>
+          <a:p>
+            <a:r>
+              <a:rPr lang="en-US" sz="2400" dirty="0">
+                <a:solidFill>
+                  <a:srgbClr val="FFFF00"/>
+                </a:solidFill>
+                <a:hlinkClick r:id="rId3">
+                  <a:extLst>
+                    <a:ext uri="{A12FA001-AC4F-418D-AE19-62706E023703}">
+                      <ahyp:hlinkClr xmlns:ahyp="http://schemas.microsoft.com/office/drawing/2018/hyperlinkcolor" val="tx"/>
+                    </a:ext>
+                  </a:extLst>
+                </a:hlinkClick>
               </a:rPr>
               <a:t>phil@woodstreet.org.uk</a:t>
             </a:r>
-            <a:endParaRPr lang="en-US" dirty="0"/>
-          </a:p>
-          <a:p>
-            <a:r>
-              <a:rPr lang="en-US" dirty="0">
-                <a:hlinkClick r:id="rId4"/>
+            <a:endParaRPr lang="en-US" sz="2400" dirty="0">
+              <a:solidFill>
+                <a:srgbClr val="FFFF00"/>
+              </a:solidFill>
+            </a:endParaRPr>
+          </a:p>
+          <a:p>
+            <a:r>
+              <a:rPr lang="en-US" sz="2400" dirty="0">
+                <a:solidFill>
+                  <a:srgbClr val="FFFF00"/>
+                </a:solidFill>
+                <a:hlinkClick r:id="rId4">
+                  <a:extLst>
+                    <a:ext uri="{A12FA001-AC4F-418D-AE19-62706E023703}">
+                      <ahyp:hlinkClr xmlns:ahyp="http://schemas.microsoft.com/office/drawing/2018/hyperlinkcolor" val="tx"/>
+                    </a:ext>
+                  </a:extLst>
+                </a:hlinkClick>
               </a:rPr>
               <a:t>https://github.com/philipmason/Wood-Street-Consultants</a:t>
             </a:r>
             <a:r>
-              <a:rPr lang="en-US" dirty="0"/>
+              <a:rPr lang="en-US" sz="2400" dirty="0">
+                <a:solidFill>
+                  <a:srgbClr val="FFFF00"/>
+                </a:solidFill>
+              </a:rPr>
               <a:t> </a:t>
             </a:r>
           </a:p>
           <a:p>
-            <a:endParaRPr lang="en-US" dirty="0"/>
-          </a:p>
-          <a:p>
-            <a:r>
-              <a:rPr lang="en-US" dirty="0">
-                <a:hlinkClick r:id="rId5"/>
+            <a:endParaRPr lang="en-US" sz="2400" dirty="0">
+              <a:solidFill>
+                <a:srgbClr val="FFFF00"/>
+              </a:solidFill>
+            </a:endParaRPr>
+          </a:p>
+          <a:p>
+            <a:r>
+              <a:rPr lang="en-US" sz="2400" dirty="0">
+                <a:solidFill>
+                  <a:srgbClr val="FFFF00"/>
+                </a:solidFill>
+                <a:hlinkClick r:id="rId5">
+                  <a:extLst>
+                    <a:ext uri="{A12FA001-AC4F-418D-AE19-62706E023703}">
+                      <ahyp:hlinkClr xmlns:ahyp="http://schemas.microsoft.com/office/drawing/2018/hyperlinkcolor" val="tx"/>
+                    </a:ext>
+                  </a:extLst>
+                </a:hlinkClick>
               </a:rPr>
               <a:t>https://www.linkedin.com/in/philmason/</a:t>
             </a:r>
             <a:r>
-              <a:rPr lang="en-US" dirty="0"/>
+              <a:rPr lang="en-US" sz="2400" dirty="0">
+                <a:solidFill>
+                  <a:srgbClr val="FFFF00"/>
+                </a:solidFill>
+              </a:rPr>
               <a:t> </a:t>
             </a:r>
           </a:p>
@@ -22460,7 +22731,11 @@
               <a:buChar char="•"/>
             </a:pPr>
             <a:r>
-              <a:rPr lang="en-US" dirty="0"/>
+              <a:rPr lang="en-US" dirty="0">
+                <a:solidFill>
+                  <a:srgbClr val="00B050"/>
+                </a:solidFill>
+              </a:rPr>
               <a:t>Define each thing to look for</a:t>
             </a:r>
           </a:p>
@@ -22470,7 +22745,11 @@
               <a:buChar char="•"/>
             </a:pPr>
             <a:r>
-              <a:rPr lang="en-US" dirty="0"/>
+              <a:rPr lang="en-US" dirty="0">
+                <a:solidFill>
+                  <a:srgbClr val="00B050"/>
+                </a:solidFill>
+              </a:rPr>
               <a:t>Implement code to use those rules to analyze log</a:t>
             </a:r>
           </a:p>
@@ -22482,7 +22761,7 @@
             <a:r>
               <a:rPr lang="en-US" dirty="0">
                 <a:solidFill>
-                  <a:schemeClr val="accent1"/>
+                  <a:srgbClr val="00B050"/>
                 </a:solidFill>
               </a:rPr>
               <a:t>Do this in SAS</a:t>
@@ -22496,7 +22775,7 @@
             <a:r>
               <a:rPr lang="en-US" dirty="0">
                 <a:solidFill>
-                  <a:schemeClr val="accent1"/>
+                  <a:srgbClr val="00B050"/>
                 </a:solidFill>
               </a:rPr>
               <a:t>Do this in JavaScript</a:t>
@@ -22508,7 +22787,11 @@
               <a:buChar char="•"/>
             </a:pPr>
             <a:r>
-              <a:rPr lang="en-US" dirty="0"/>
+              <a:rPr lang="en-US" dirty="0">
+                <a:solidFill>
+                  <a:srgbClr val="00B050"/>
+                </a:solidFill>
+              </a:rPr>
               <a:t>Build a web application to provide interactive interface to results</a:t>
             </a:r>
           </a:p>
@@ -22732,6 +23015,50 @@
       </p:grpSpPr>
       <p:sp>
         <p:nvSpPr>
+          <p:cNvPr id="11" name="Rectangle 10">
+            <a:extLst>
+              <a:ext uri="{FF2B5EF4-FFF2-40B4-BE49-F238E27FC236}">
+                <a16:creationId xmlns:a16="http://schemas.microsoft.com/office/drawing/2014/main" id="{99C8BAFA-CF94-C32E-7FAE-3B56824139BA}"/>
+              </a:ext>
+            </a:extLst>
+          </p:cNvPr>
+          <p:cNvSpPr/>
+          <p:nvPr/>
+        </p:nvSpPr>
+        <p:spPr>
+          <a:xfrm>
+            <a:off x="2814705" y="2578100"/>
+            <a:ext cx="9377295" cy="3149600"/>
+          </a:xfrm>
+          <a:prstGeom prst="rect">
+            <a:avLst/>
+          </a:prstGeom>
+        </p:spPr>
+        <p:style>
+          <a:lnRef idx="1">
+            <a:schemeClr val="accent5"/>
+          </a:lnRef>
+          <a:fillRef idx="2">
+            <a:schemeClr val="accent5"/>
+          </a:fillRef>
+          <a:effectRef idx="1">
+            <a:schemeClr val="accent5"/>
+          </a:effectRef>
+          <a:fontRef idx="minor">
+            <a:schemeClr val="dk1"/>
+          </a:fontRef>
+        </p:style>
+        <p:txBody>
+          <a:bodyPr rtlCol="0" anchor="ctr"/>
+          <a:lstStyle/>
+          <a:p>
+            <a:pPr algn="ctr"/>
+            <a:endParaRPr lang="en-GB"/>
+          </a:p>
+        </p:txBody>
+      </p:sp>
+      <p:sp>
+        <p:nvSpPr>
           <p:cNvPr id="4" name="Title 3">
             <a:extLst>
               <a:ext uri="{FF2B5EF4-FFF2-40B4-BE49-F238E27FC236}">
@@ -22800,6 +23127,9 @@
             </a:pPr>
             <a:r>
               <a:rPr lang="en-GB" b="0" dirty="0">
+                <a:solidFill>
+                  <a:srgbClr val="00B050"/>
+                </a:solidFill>
                 <a:effectLst/>
                 <a:highlight>
                   <a:srgbClr val="FFFFFF"/>
@@ -22809,6 +23139,9 @@
             </a:r>
             <a:r>
               <a:rPr lang="en-GB" dirty="0" err="1">
+                <a:solidFill>
+                  <a:srgbClr val="00B050"/>
+                </a:solidFill>
                 <a:effectLst/>
                 <a:highlight>
                   <a:srgbClr val="FFFFFF"/>
@@ -22818,6 +23151,9 @@
             </a:r>
             <a:r>
               <a:rPr lang="en-GB" b="0" dirty="0">
+                <a:solidFill>
+                  <a:srgbClr val="00B050"/>
+                </a:solidFill>
                 <a:effectLst/>
                 <a:highlight>
                   <a:srgbClr val="FFFFFF"/>
@@ -22834,6 +23170,9 @@
             </a:pPr>
             <a:r>
               <a:rPr lang="en-GB" b="0" dirty="0">
+                <a:solidFill>
+                  <a:srgbClr val="00B050"/>
+                </a:solidFill>
                 <a:effectLst/>
                 <a:highlight>
                   <a:srgbClr val="FFFFFF"/>
@@ -22843,6 +23182,9 @@
             </a:r>
             <a:r>
               <a:rPr lang="en-GB" dirty="0">
+                <a:solidFill>
+                  <a:srgbClr val="00B050"/>
+                </a:solidFill>
                 <a:effectLst/>
                 <a:highlight>
                   <a:srgbClr val="FFFFFF"/>
@@ -22852,6 +23194,9 @@
             </a:r>
             <a:r>
               <a:rPr lang="en-GB" b="0" dirty="0">
+                <a:solidFill>
+                  <a:srgbClr val="00B050"/>
+                </a:solidFill>
                 <a:effectLst/>
                 <a:highlight>
                   <a:srgbClr val="FFFFFF"/>
@@ -22861,6 +23206,9 @@
             </a:r>
             <a:r>
               <a:rPr lang="en-GB" b="0" dirty="0" err="1">
+                <a:solidFill>
+                  <a:srgbClr val="00B050"/>
+                </a:solidFill>
                 <a:effectLst/>
                 <a:highlight>
                   <a:srgbClr val="FFFFFF"/>
@@ -22870,6 +23218,9 @@
             </a:r>
             <a:r>
               <a:rPr lang="en-GB" b="0" dirty="0">
+                <a:solidFill>
+                  <a:srgbClr val="00B050"/>
+                </a:solidFill>
                 <a:effectLst/>
                 <a:highlight>
                   <a:srgbClr val="FFFFFF"/>
@@ -22886,6 +23237,9 @@
             </a:pPr>
             <a:r>
               <a:rPr lang="en-GB" b="0" dirty="0">
+                <a:solidFill>
+                  <a:srgbClr val="00B050"/>
+                </a:solidFill>
                 <a:effectLst/>
                 <a:highlight>
                   <a:srgbClr val="FFFFFF"/>
@@ -22895,6 +23249,9 @@
             </a:r>
             <a:r>
               <a:rPr lang="en-GB" dirty="0">
+                <a:solidFill>
+                  <a:srgbClr val="00B050"/>
+                </a:solidFill>
                 <a:effectLst/>
                 <a:highlight>
                   <a:srgbClr val="FFFFFF"/>
@@ -22904,6 +23261,9 @@
             </a:r>
             <a:r>
               <a:rPr lang="en-GB" b="0" dirty="0">
+                <a:solidFill>
+                  <a:srgbClr val="00B050"/>
+                </a:solidFill>
                 <a:effectLst/>
                 <a:highlight>
                   <a:srgbClr val="FFFFFF"/>
@@ -22920,6 +23280,9 @@
             </a:pPr>
             <a:r>
               <a:rPr lang="en-GB" b="0" dirty="0">
+                <a:solidFill>
+                  <a:srgbClr val="00B050"/>
+                </a:solidFill>
                 <a:effectLst/>
                 <a:highlight>
                   <a:srgbClr val="FFFFFF"/>
@@ -22929,6 +23292,9 @@
             </a:r>
             <a:r>
               <a:rPr lang="en-GB" dirty="0">
+                <a:solidFill>
+                  <a:srgbClr val="00B050"/>
+                </a:solidFill>
                 <a:effectLst/>
                 <a:highlight>
                   <a:srgbClr val="FFFFFF"/>
@@ -22938,6 +23304,9 @@
             </a:r>
             <a:r>
               <a:rPr lang="en-GB" b="0" dirty="0">
+                <a:solidFill>
+                  <a:srgbClr val="00B050"/>
+                </a:solidFill>
                 <a:effectLst/>
                 <a:highlight>
                   <a:srgbClr val="FFFFFF"/>
@@ -22954,6 +23323,9 @@
             </a:pPr>
             <a:r>
               <a:rPr lang="en-GB" b="0" dirty="0">
+                <a:solidFill>
+                  <a:srgbClr val="00B050"/>
+                </a:solidFill>
                 <a:effectLst/>
                 <a:highlight>
                   <a:srgbClr val="FFFFFF"/>
@@ -22963,6 +23335,9 @@
             </a:r>
             <a:r>
               <a:rPr lang="en-GB" dirty="0" err="1">
+                <a:solidFill>
+                  <a:srgbClr val="00B050"/>
+                </a:solidFill>
                 <a:effectLst/>
                 <a:highlight>
                   <a:srgbClr val="FFFFFF"/>
@@ -22972,6 +23347,9 @@
             </a:r>
             <a:r>
               <a:rPr lang="en-GB" b="0" dirty="0">
+                <a:solidFill>
+                  <a:srgbClr val="00B050"/>
+                </a:solidFill>
                 <a:effectLst/>
                 <a:highlight>
                   <a:srgbClr val="FFFFFF"/>
@@ -22988,6 +23366,9 @@
             </a:pPr>
             <a:r>
               <a:rPr lang="en-GB" b="0" dirty="0">
+                <a:solidFill>
+                  <a:srgbClr val="00B050"/>
+                </a:solidFill>
                 <a:effectLst/>
                 <a:highlight>
                   <a:srgbClr val="FFFFFF"/>
@@ -22997,6 +23378,9 @@
             </a:r>
             <a:r>
               <a:rPr lang="en-GB" dirty="0">
+                <a:solidFill>
+                  <a:srgbClr val="00B050"/>
+                </a:solidFill>
                 <a:effectLst/>
                 <a:highlight>
                   <a:srgbClr val="FFFFFF"/>
@@ -23006,6 +23390,9 @@
             </a:r>
             <a:r>
               <a:rPr lang="en-GB" b="0" dirty="0">
+                <a:solidFill>
+                  <a:srgbClr val="00B050"/>
+                </a:solidFill>
                 <a:effectLst/>
                 <a:highlight>
                   <a:srgbClr val="FFFFFF"/>
@@ -23013,7 +23400,11 @@
               </a:rPr>
               <a:t>": "NOTE",</a:t>
             </a:r>
-            <a:endParaRPr lang="en-GB" b="0" dirty="0"/>
+            <a:endParaRPr lang="en-GB" b="0" dirty="0">
+              <a:solidFill>
+                <a:srgbClr val="00B050"/>
+              </a:solidFill>
+            </a:endParaRPr>
           </a:p>
         </p:txBody>
       </p:sp>
@@ -23043,6 +23434,287 @@
           <a:bodyPr/>
           <a:lstStyle/>
           <a:p>
+            <a:endParaRPr lang="en-GB"/>
+          </a:p>
+        </p:txBody>
+      </p:sp>
+      <p:sp>
+        <p:nvSpPr>
+          <p:cNvPr id="2" name="TextBox 1">
+            <a:extLst>
+              <a:ext uri="{FF2B5EF4-FFF2-40B4-BE49-F238E27FC236}">
+                <a16:creationId xmlns:a16="http://schemas.microsoft.com/office/drawing/2014/main" id="{57414F15-DFE7-BC12-C30D-81F80C587CEB}"/>
+              </a:ext>
+            </a:extLst>
+          </p:cNvPr>
+          <p:cNvSpPr txBox="1"/>
+          <p:nvPr/>
+        </p:nvSpPr>
+        <p:spPr>
+          <a:xfrm>
+            <a:off x="2895575" y="2693882"/>
+            <a:ext cx="9528571" cy="369332"/>
+          </a:xfrm>
+          <a:prstGeom prst="rect">
+            <a:avLst/>
+          </a:prstGeom>
+          <a:noFill/>
+        </p:spPr>
+        <p:txBody>
+          <a:bodyPr wrap="none" rtlCol="0">
+            <a:spAutoFit/>
+          </a:bodyPr>
+          <a:lstStyle/>
+          <a:p>
+            <a:r>
+              <a:rPr lang="en-GB" b="1" dirty="0">
+                <a:effectLst/>
+                <a:highlight>
+                  <a:srgbClr val="FFFFFF"/>
+                </a:highlight>
+                <a:latin typeface="Courier New" panose="02070309020205020404" pitchFamily="49" charset="0"/>
+                <a:cs typeface="Courier New" panose="02070309020205020404" pitchFamily="49" charset="0"/>
+              </a:rPr>
+              <a:t>NOTE: Copyright (c) 2002-2012 by SAS Institute Inc., Cary, NC, USA.</a:t>
+            </a:r>
+          </a:p>
+        </p:txBody>
+      </p:sp>
+      <p:sp>
+        <p:nvSpPr>
+          <p:cNvPr id="3" name="TextBox 2">
+            <a:extLst>
+              <a:ext uri="{FF2B5EF4-FFF2-40B4-BE49-F238E27FC236}">
+                <a16:creationId xmlns:a16="http://schemas.microsoft.com/office/drawing/2014/main" id="{969FB260-8F5F-783A-57A2-3BB6AFD65D82}"/>
+              </a:ext>
+            </a:extLst>
+          </p:cNvPr>
+          <p:cNvSpPr txBox="1"/>
+          <p:nvPr/>
+        </p:nvSpPr>
+        <p:spPr>
+          <a:xfrm>
+            <a:off x="2814705" y="3712884"/>
+            <a:ext cx="9690310" cy="923330"/>
+          </a:xfrm>
+          <a:prstGeom prst="rect">
+            <a:avLst/>
+          </a:prstGeom>
+          <a:noFill/>
+        </p:spPr>
+        <p:txBody>
+          <a:bodyPr wrap="square" rtlCol="0">
+            <a:spAutoFit/>
+          </a:bodyPr>
+          <a:lstStyle/>
+          <a:p>
+            <a:r>
+              <a:rPr lang="en-GB" b="1" dirty="0">
+                <a:effectLst/>
+                <a:highlight>
+                  <a:srgbClr val="FFFFFF"/>
+                </a:highlight>
+                <a:latin typeface="Courier New" panose="02070309020205020404" pitchFamily="49" charset="0"/>
+                <a:cs typeface="Courier New" panose="02070309020205020404" pitchFamily="49" charset="0"/>
+              </a:rPr>
+              <a:t>&lt;span style='</a:t>
+            </a:r>
+            <a:r>
+              <a:rPr lang="en-GB" b="1" dirty="0" err="1">
+                <a:effectLst/>
+                <a:highlight>
+                  <a:srgbClr val="FFFFFF"/>
+                </a:highlight>
+                <a:latin typeface="Courier New" panose="02070309020205020404" pitchFamily="49" charset="0"/>
+                <a:cs typeface="Courier New" panose="02070309020205020404" pitchFamily="49" charset="0"/>
+              </a:rPr>
+              <a:t>color</a:t>
+            </a:r>
+            <a:r>
+              <a:rPr lang="en-GB" b="1" dirty="0">
+                <a:effectLst/>
+                <a:highlight>
+                  <a:srgbClr val="FFFFFF"/>
+                </a:highlight>
+                <a:latin typeface="Courier New" panose="02070309020205020404" pitchFamily="49" charset="0"/>
+                <a:cs typeface="Courier New" panose="02070309020205020404" pitchFamily="49" charset="0"/>
+              </a:rPr>
+              <a:t>: blue’&gt;</a:t>
+            </a:r>
+            <a:br>
+              <a:rPr lang="en-GB" b="0" dirty="0">
+                <a:effectLst/>
+                <a:highlight>
+                  <a:srgbClr val="FFFFFF"/>
+                </a:highlight>
+                <a:latin typeface="Courier New" panose="02070309020205020404" pitchFamily="49" charset="0"/>
+                <a:cs typeface="Courier New" panose="02070309020205020404" pitchFamily="49" charset="0"/>
+              </a:rPr>
+            </a:br>
+            <a:r>
+              <a:rPr lang="en-GB" b="0" dirty="0">
+                <a:effectLst/>
+                <a:highlight>
+                  <a:srgbClr val="FFFFFF"/>
+                </a:highlight>
+                <a:latin typeface="Courier New" panose="02070309020205020404" pitchFamily="49" charset="0"/>
+                <a:cs typeface="Courier New" panose="02070309020205020404" pitchFamily="49" charset="0"/>
+              </a:rPr>
+              <a:t>NOTE: Copyright (c) 2002-2012 by SAS Institute Inc., Cary, NC, USA.</a:t>
+            </a:r>
+            <a:br>
+              <a:rPr lang="en-GB" b="0" dirty="0">
+                <a:effectLst/>
+                <a:highlight>
+                  <a:srgbClr val="FFFFFF"/>
+                </a:highlight>
+                <a:latin typeface="Courier New" panose="02070309020205020404" pitchFamily="49" charset="0"/>
+                <a:cs typeface="Courier New" panose="02070309020205020404" pitchFamily="49" charset="0"/>
+              </a:rPr>
+            </a:br>
+            <a:r>
+              <a:rPr lang="en-GB" b="1" dirty="0">
+                <a:effectLst/>
+                <a:highlight>
+                  <a:srgbClr val="FFFFFF"/>
+                </a:highlight>
+                <a:latin typeface="Courier New" panose="02070309020205020404" pitchFamily="49" charset="0"/>
+                <a:cs typeface="Courier New" panose="02070309020205020404" pitchFamily="49" charset="0"/>
+              </a:rPr>
+              <a:t>&lt;/span&gt;</a:t>
+            </a:r>
+          </a:p>
+        </p:txBody>
+      </p:sp>
+      <p:sp>
+        <p:nvSpPr>
+          <p:cNvPr id="7" name="TextBox 6">
+            <a:extLst>
+              <a:ext uri="{FF2B5EF4-FFF2-40B4-BE49-F238E27FC236}">
+                <a16:creationId xmlns:a16="http://schemas.microsoft.com/office/drawing/2014/main" id="{5C36DD94-35F0-3826-3852-F9CA4F118133}"/>
+              </a:ext>
+            </a:extLst>
+          </p:cNvPr>
+          <p:cNvSpPr txBox="1"/>
+          <p:nvPr/>
+        </p:nvSpPr>
+        <p:spPr>
+          <a:xfrm>
+            <a:off x="2814705" y="5236091"/>
+            <a:ext cx="7366000" cy="369332"/>
+          </a:xfrm>
+          <a:prstGeom prst="rect">
+            <a:avLst/>
+          </a:prstGeom>
+          <a:noFill/>
+        </p:spPr>
+        <p:txBody>
+          <a:bodyPr wrap="square">
+            <a:spAutoFit/>
+          </a:bodyPr>
+          <a:lstStyle/>
+          <a:p>
+            <a:r>
+              <a:rPr lang="en-GB" dirty="0">
+                <a:solidFill>
+                  <a:srgbClr val="0000FF"/>
+                </a:solidFill>
+                <a:effectLst/>
+              </a:rPr>
+              <a:t>NOTE: Copyright (c) 2002-2012 by SAS Institute Inc., Cary, NC, USA.</a:t>
+            </a:r>
+            <a:endParaRPr lang="en-GB" dirty="0"/>
+          </a:p>
+        </p:txBody>
+      </p:sp>
+      <p:sp>
+        <p:nvSpPr>
+          <p:cNvPr id="8" name="Down Arrow 7">
+            <a:extLst>
+              <a:ext uri="{FF2B5EF4-FFF2-40B4-BE49-F238E27FC236}">
+                <a16:creationId xmlns:a16="http://schemas.microsoft.com/office/drawing/2014/main" id="{3F607B30-1D75-EEA1-25CD-10749237E4F1}"/>
+              </a:ext>
+            </a:extLst>
+          </p:cNvPr>
+          <p:cNvSpPr/>
+          <p:nvPr/>
+        </p:nvSpPr>
+        <p:spPr>
+          <a:xfrm>
+            <a:off x="7233219" y="3181642"/>
+            <a:ext cx="457200" cy="520700"/>
+          </a:xfrm>
+          <a:prstGeom prst="downArrow">
+            <a:avLst/>
+          </a:prstGeom>
+        </p:spPr>
+        <p:style>
+          <a:lnRef idx="2">
+            <a:schemeClr val="accent1">
+              <a:shade val="15000"/>
+            </a:schemeClr>
+          </a:lnRef>
+          <a:fillRef idx="1">
+            <a:schemeClr val="accent1"/>
+          </a:fillRef>
+          <a:effectRef idx="0">
+            <a:schemeClr val="accent1"/>
+          </a:effectRef>
+          <a:fontRef idx="minor">
+            <a:schemeClr val="lt1"/>
+          </a:fontRef>
+        </p:style>
+        <p:txBody>
+          <a:bodyPr rtlCol="0" anchor="ctr"/>
+          <a:lstStyle/>
+          <a:p>
+            <a:pPr algn="ctr"/>
+            <a:endParaRPr lang="en-GB"/>
+          </a:p>
+        </p:txBody>
+      </p:sp>
+      <p:sp>
+        <p:nvSpPr>
+          <p:cNvPr id="9" name="Down Arrow 8">
+            <a:extLst>
+              <a:ext uri="{FF2B5EF4-FFF2-40B4-BE49-F238E27FC236}">
+                <a16:creationId xmlns:a16="http://schemas.microsoft.com/office/drawing/2014/main" id="{804B1A9C-949A-DB79-4DE8-3DF2D3C7A2F4}"/>
+              </a:ext>
+            </a:extLst>
+          </p:cNvPr>
+          <p:cNvSpPr/>
+          <p:nvPr/>
+        </p:nvSpPr>
+        <p:spPr>
+          <a:xfrm>
+            <a:off x="7251078" y="4559152"/>
+            <a:ext cx="457200" cy="520700"/>
+          </a:xfrm>
+          <a:prstGeom prst="downArrow">
+            <a:avLst/>
+          </a:prstGeom>
+        </p:spPr>
+        <p:style>
+          <a:lnRef idx="2">
+            <a:schemeClr val="accent1">
+              <a:shade val="15000"/>
+            </a:schemeClr>
+          </a:lnRef>
+          <a:fillRef idx="1">
+            <a:schemeClr val="accent1"/>
+          </a:fillRef>
+          <a:effectRef idx="0">
+            <a:schemeClr val="accent1"/>
+          </a:effectRef>
+          <a:fontRef idx="minor">
+            <a:schemeClr val="lt1"/>
+          </a:fontRef>
+        </p:style>
+        <p:txBody>
+          <a:bodyPr rtlCol="0" anchor="ctr"/>
+          <a:lstStyle/>
+          <a:p>
+            <a:pPr algn="ctr"/>
             <a:endParaRPr lang="en-GB"/>
           </a:p>
         </p:txBody>
@@ -24086,6 +24758,9 @@
             </a:pPr>
             <a:r>
               <a:rPr lang="en-GB" b="0" dirty="0">
+                <a:solidFill>
+                  <a:srgbClr val="00B050"/>
+                </a:solidFill>
                 <a:effectLst/>
                 <a:highlight>
                   <a:srgbClr val="FFFFFF"/>
@@ -24095,6 +24770,9 @@
             </a:r>
             <a:r>
               <a:rPr lang="en-GB" dirty="0" err="1">
+                <a:solidFill>
+                  <a:srgbClr val="00B050"/>
+                </a:solidFill>
                 <a:effectLst/>
                 <a:highlight>
                   <a:srgbClr val="FFFFFF"/>
@@ -24104,6 +24782,9 @@
             </a:r>
             <a:r>
               <a:rPr lang="en-GB" b="0" dirty="0">
+                <a:solidFill>
+                  <a:srgbClr val="00B050"/>
+                </a:solidFill>
                 <a:effectLst/>
                 <a:highlight>
                   <a:srgbClr val="FFFFFF"/>
@@ -24120,6 +24801,9 @@
             </a:pPr>
             <a:r>
               <a:rPr lang="en-GB" b="0" dirty="0">
+                <a:solidFill>
+                  <a:srgbClr val="00B050"/>
+                </a:solidFill>
                 <a:effectLst/>
                 <a:highlight>
                   <a:srgbClr val="FFFFFF"/>
@@ -24129,6 +24813,9 @@
             </a:r>
             <a:r>
               <a:rPr lang="en-GB" dirty="0">
+                <a:solidFill>
+                  <a:srgbClr val="00B050"/>
+                </a:solidFill>
                 <a:effectLst/>
                 <a:highlight>
                   <a:srgbClr val="FFFFFF"/>
@@ -24138,6 +24825,9 @@
             </a:r>
             <a:r>
               <a:rPr lang="en-GB" b="0" dirty="0">
+                <a:solidFill>
+                  <a:srgbClr val="00B050"/>
+                </a:solidFill>
                 <a:effectLst/>
                 <a:highlight>
                   <a:srgbClr val="FFFFFF"/>
@@ -24154,6 +24844,9 @@
             </a:pPr>
             <a:r>
               <a:rPr lang="en-GB" b="0" dirty="0">
+                <a:solidFill>
+                  <a:srgbClr val="00B050"/>
+                </a:solidFill>
                 <a:effectLst/>
                 <a:highlight>
                   <a:srgbClr val="FFFFFF"/>
@@ -24163,6 +24856,9 @@
             </a:r>
             <a:r>
               <a:rPr lang="en-GB" dirty="0">
+                <a:solidFill>
+                  <a:srgbClr val="00B050"/>
+                </a:solidFill>
                 <a:effectLst/>
                 <a:highlight>
                   <a:srgbClr val="FFFFFF"/>
@@ -24172,6 +24868,9 @@
             </a:r>
             <a:r>
               <a:rPr lang="en-GB" b="0" dirty="0">
+                <a:solidFill>
+                  <a:srgbClr val="00B050"/>
+                </a:solidFill>
                 <a:effectLst/>
                 <a:highlight>
                   <a:srgbClr val="FFFFFF"/>
@@ -24181,6 +24880,9 @@
             </a:r>
             <a:r>
               <a:rPr lang="en-GB" b="0" dirty="0" err="1">
+                <a:solidFill>
+                  <a:srgbClr val="00B050"/>
+                </a:solidFill>
                 <a:effectLst/>
                 <a:highlight>
                   <a:srgbClr val="FFFFFF"/>
@@ -24190,6 +24892,9 @@
             </a:r>
             <a:r>
               <a:rPr lang="en-GB" b="0" dirty="0">
+                <a:solidFill>
+                  <a:srgbClr val="00B050"/>
+                </a:solidFill>
                 <a:effectLst/>
                 <a:highlight>
                   <a:srgbClr val="FFFFFF"/>
@@ -24206,6 +24911,9 @@
             </a:pPr>
             <a:r>
               <a:rPr lang="en-GB" b="0" dirty="0">
+                <a:solidFill>
+                  <a:srgbClr val="00B050"/>
+                </a:solidFill>
                 <a:effectLst/>
                 <a:highlight>
                   <a:srgbClr val="FFFFFF"/>
@@ -24215,6 +24923,9 @@
             </a:r>
             <a:r>
               <a:rPr lang="en-GB" dirty="0">
+                <a:solidFill>
+                  <a:srgbClr val="00B050"/>
+                </a:solidFill>
                 <a:effectLst/>
                 <a:highlight>
                   <a:srgbClr val="FFFFFF"/>
@@ -24224,6 +24935,9 @@
             </a:r>
             <a:r>
               <a:rPr lang="en-GB" b="0" dirty="0">
+                <a:solidFill>
+                  <a:srgbClr val="00B050"/>
+                </a:solidFill>
                 <a:effectLst/>
                 <a:highlight>
                   <a:srgbClr val="FFFFFF"/>
@@ -24240,6 +24954,9 @@
             </a:pPr>
             <a:r>
               <a:rPr lang="en-GB" b="0" dirty="0">
+                <a:solidFill>
+                  <a:srgbClr val="00B050"/>
+                </a:solidFill>
                 <a:effectLst/>
                 <a:highlight>
                   <a:srgbClr val="FFFFFF"/>
@@ -24249,6 +24966,9 @@
             </a:r>
             <a:r>
               <a:rPr lang="en-GB" dirty="0">
+                <a:solidFill>
+                  <a:srgbClr val="00B050"/>
+                </a:solidFill>
                 <a:effectLst/>
                 <a:highlight>
                   <a:srgbClr val="FFFFFF"/>
@@ -24258,6 +24978,9 @@
             </a:r>
             <a:r>
               <a:rPr lang="en-GB" b="0" dirty="0">
+                <a:solidFill>
+                  <a:srgbClr val="00B050"/>
+                </a:solidFill>
                 <a:effectLst/>
                 <a:highlight>
                   <a:srgbClr val="FFFFFF"/>
@@ -24274,6 +24997,9 @@
             </a:pPr>
             <a:r>
               <a:rPr lang="en-GB" b="0" dirty="0">
+                <a:solidFill>
+                  <a:srgbClr val="00B050"/>
+                </a:solidFill>
                 <a:effectLst/>
                 <a:highlight>
                   <a:srgbClr val="FFFFFF"/>
@@ -24283,6 +25009,9 @@
             </a:r>
             <a:r>
               <a:rPr lang="en-GB" dirty="0" err="1">
+                <a:solidFill>
+                  <a:srgbClr val="00B050"/>
+                </a:solidFill>
                 <a:effectLst/>
                 <a:highlight>
                   <a:srgbClr val="FFFFFF"/>
@@ -24292,6 +25021,9 @@
             </a:r>
             <a:r>
               <a:rPr lang="en-GB" b="0" dirty="0">
+                <a:solidFill>
+                  <a:srgbClr val="00B050"/>
+                </a:solidFill>
                 <a:effectLst/>
                 <a:highlight>
                   <a:srgbClr val="FFFFFF"/>
@@ -24308,6 +25040,9 @@
             </a:pPr>
             <a:r>
               <a:rPr lang="en-GB" b="0" dirty="0">
+                <a:solidFill>
+                  <a:srgbClr val="00B050"/>
+                </a:solidFill>
                 <a:effectLst/>
                 <a:highlight>
                   <a:srgbClr val="FFFFFF"/>
@@ -24317,6 +25052,9 @@
             </a:r>
             <a:r>
               <a:rPr lang="en-GB" dirty="0">
+                <a:solidFill>
+                  <a:srgbClr val="00B050"/>
+                </a:solidFill>
                 <a:effectLst/>
                 <a:highlight>
                   <a:srgbClr val="FFFFFF"/>
@@ -24326,6 +25064,9 @@
             </a:r>
             <a:r>
               <a:rPr lang="en-GB" b="0" dirty="0">
+                <a:solidFill>
+                  <a:srgbClr val="00B050"/>
+                </a:solidFill>
                 <a:effectLst/>
                 <a:highlight>
                   <a:srgbClr val="FFFFFF"/>
@@ -24335,7 +25076,11 @@
             </a:r>
           </a:p>
           <a:p>
-            <a:endParaRPr lang="en-GB" b="0" dirty="0"/>
+            <a:endParaRPr lang="en-GB" b="0" dirty="0">
+              <a:solidFill>
+                <a:srgbClr val="00B050"/>
+              </a:solidFill>
+            </a:endParaRPr>
           </a:p>
         </p:txBody>
       </p:sp>

</xml_diff>